<commit_message>
seller nao vetex sem pagamento
</commit_message>
<xml_diff>
--- a/integracao/ERP-catalogo-expresso/SKU to VTEXADMIN to SITE.pptx
+++ b/integracao/ERP-catalogo-expresso/SKU to VTEXADMIN to SITE.pptx
@@ -10311,7 +10311,7 @@
         </p:nvSpPr>
         <p:spPr>
           <a:xfrm>
-            <a:off x="1180685" y="3823405"/>
+            <a:off x="1180685" y="3993224"/>
             <a:ext cx="1497347" cy="511836"/>
           </a:xfrm>
           <a:prstGeom prst="rect">
@@ -10354,7 +10354,7 @@
         </p:nvSpPr>
         <p:spPr>
           <a:xfrm rot="-60000">
-            <a:off x="1130973" y="3761641"/>
+            <a:off x="1130973" y="3931460"/>
             <a:ext cx="1619324" cy="646112"/>
           </a:xfrm>
           <a:prstGeom prst="rect">
@@ -10369,14 +10369,14 @@
           <a:p>
             <a:pPr algn="ctr"/>
             <a:r>
-              <a:rPr lang="en-US" sz="3600">
+              <a:rPr lang="en-US" sz="3600" dirty="0">
                 <a:solidFill>
                   <a:srgbClr val="FF0000"/>
                 </a:solidFill>
               </a:rPr>
               <a:t>$ $</a:t>
             </a:r>
-            <a:endParaRPr lang="en-US" sz="3600"/>
+            <a:endParaRPr lang="en-US" sz="3600" dirty="0"/>
           </a:p>
         </p:txBody>
       </p:sp>
@@ -10787,7 +10787,7 @@
         </p:nvSpPr>
         <p:spPr>
           <a:xfrm>
-            <a:off x="3020070" y="5175340"/>
+            <a:off x="3020070" y="5575376"/>
             <a:ext cx="3937000" cy="768257"/>
           </a:xfrm>
           <a:prstGeom prst="rightArrow">
@@ -10831,7 +10831,7 @@
         </p:nvSpPr>
         <p:spPr>
           <a:xfrm>
-            <a:off x="3020070" y="5682338"/>
+            <a:off x="3020070" y="4947578"/>
             <a:ext cx="3937000" cy="800109"/>
           </a:xfrm>
           <a:prstGeom prst="rightArrow">

</xml_diff>

<commit_message>
catalogo completo - parcial
</commit_message>
<xml_diff>
--- a/integracao/ERP-catalogo-expresso/SKU to VTEXADMIN to SITE.pptx
+++ b/integracao/ERP-catalogo-expresso/SKU to VTEXADMIN to SITE.pptx
@@ -113,7 +113,7 @@
   </p:defaultTextStyle>
   <p:extLst>
     <p:ext uri="{EFAFB233-063F-42B5-8137-9DF3F51BA10A}">
-      <p15:sldGuideLst xmlns="" xmlns:p15="http://schemas.microsoft.com/office/powerpoint/2012/main"/>
+      <p15:sldGuideLst xmlns:p15="http://schemas.microsoft.com/office/powerpoint/2012/main" xmlns=""/>
     </p:ext>
   </p:extLst>
 </p:presentation>
@@ -202,7 +202,7 @@
             <a:fld id="{C4ADB47E-E962-47A6-A424-6C5C29F7C662}" type="datetimeFigureOut">
               <a:rPr lang="en-US"/>
               <a:pPr/>
-              <a:t>10/22/2014</a:t>
+              <a:t>10/29/2014</a:t>
             </a:fld>
             <a:endParaRPr lang="en-US"/>
           </a:p>
@@ -370,7 +370,7 @@
     </p:spTree>
     <p:extLst>
       <p:ext uri="{BB962C8B-B14F-4D97-AF65-F5344CB8AC3E}">
-        <p14:creationId xmlns="" xmlns:p14="http://schemas.microsoft.com/office/powerpoint/2010/main" val="734493671"/>
+        <p14:creationId xmlns:p14="http://schemas.microsoft.com/office/powerpoint/2010/main" xmlns="" val="734493671"/>
       </p:ext>
     </p:extLst>
   </p:cSld>
@@ -545,7 +545,7 @@
     </p:spTree>
     <p:extLst>
       <p:ext uri="{BB962C8B-B14F-4D97-AF65-F5344CB8AC3E}">
-        <p14:creationId xmlns="" xmlns:p14="http://schemas.microsoft.com/office/powerpoint/2010/main" val="2573548436"/>
+        <p14:creationId xmlns:p14="http://schemas.microsoft.com/office/powerpoint/2010/main" xmlns="" val="2573548436"/>
       </p:ext>
     </p:extLst>
   </p:cSld>
@@ -630,7 +630,7 @@
     </p:spTree>
     <p:extLst>
       <p:ext uri="{BB962C8B-B14F-4D97-AF65-F5344CB8AC3E}">
-        <p14:creationId xmlns="" xmlns:p14="http://schemas.microsoft.com/office/powerpoint/2010/main" val="2312861466"/>
+        <p14:creationId xmlns:p14="http://schemas.microsoft.com/office/powerpoint/2010/main" xmlns="" val="2312861466"/>
       </p:ext>
     </p:extLst>
   </p:cSld>
@@ -715,7 +715,7 @@
     </p:spTree>
     <p:extLst>
       <p:ext uri="{BB962C8B-B14F-4D97-AF65-F5344CB8AC3E}">
-        <p14:creationId xmlns="" xmlns:p14="http://schemas.microsoft.com/office/powerpoint/2010/main" val="2312861466"/>
+        <p14:creationId xmlns:p14="http://schemas.microsoft.com/office/powerpoint/2010/main" xmlns="" val="2312861466"/>
       </p:ext>
     </p:extLst>
   </p:cSld>
@@ -800,7 +800,7 @@
     </p:spTree>
     <p:extLst>
       <p:ext uri="{BB962C8B-B14F-4D97-AF65-F5344CB8AC3E}">
-        <p14:creationId xmlns="" xmlns:p14="http://schemas.microsoft.com/office/powerpoint/2010/main" val="3493063176"/>
+        <p14:creationId xmlns:p14="http://schemas.microsoft.com/office/powerpoint/2010/main" xmlns="" val="3493063176"/>
       </p:ext>
     </p:extLst>
   </p:cSld>
@@ -885,7 +885,7 @@
     </p:spTree>
     <p:extLst>
       <p:ext uri="{BB962C8B-B14F-4D97-AF65-F5344CB8AC3E}">
-        <p14:creationId xmlns="" xmlns:p14="http://schemas.microsoft.com/office/powerpoint/2010/main" val="3977470003"/>
+        <p14:creationId xmlns:p14="http://schemas.microsoft.com/office/powerpoint/2010/main" xmlns="" val="3977470003"/>
       </p:ext>
     </p:extLst>
   </p:cSld>
@@ -1027,7 +1027,7 @@
             <a:fld id="{F1FA7AC5-6045-4418-8E60-F48788734473}" type="datetimeFigureOut">
               <a:rPr lang="en-US" smtClean="0"/>
               <a:pPr/>
-              <a:t>10/22/2014</a:t>
+              <a:t>10/29/2014</a:t>
             </a:fld>
             <a:endParaRPr lang="en-US"/>
           </a:p>
@@ -1079,7 +1079,7 @@
     </p:spTree>
     <p:extLst>
       <p:ext uri="{BB962C8B-B14F-4D97-AF65-F5344CB8AC3E}">
-        <p14:creationId xmlns="" xmlns:p14="http://schemas.microsoft.com/office/powerpoint/2010/main" val="508168537"/>
+        <p14:creationId xmlns:p14="http://schemas.microsoft.com/office/powerpoint/2010/main" xmlns="" val="508168537"/>
       </p:ext>
     </p:extLst>
   </p:cSld>
@@ -1199,7 +1199,7 @@
             <a:fld id="{F1FA7AC5-6045-4418-8E60-F48788734473}" type="datetimeFigureOut">
               <a:rPr lang="en-US" smtClean="0"/>
               <a:pPr/>
-              <a:t>10/22/2014</a:t>
+              <a:t>10/29/2014</a:t>
             </a:fld>
             <a:endParaRPr lang="en-US"/>
           </a:p>
@@ -1251,7 +1251,7 @@
     </p:spTree>
     <p:extLst>
       <p:ext uri="{BB962C8B-B14F-4D97-AF65-F5344CB8AC3E}">
-        <p14:creationId xmlns="" xmlns:p14="http://schemas.microsoft.com/office/powerpoint/2010/main" val="613236000"/>
+        <p14:creationId xmlns:p14="http://schemas.microsoft.com/office/powerpoint/2010/main" xmlns="" val="613236000"/>
       </p:ext>
     </p:extLst>
   </p:cSld>
@@ -1381,7 +1381,7 @@
             <a:fld id="{F1FA7AC5-6045-4418-8E60-F48788734473}" type="datetimeFigureOut">
               <a:rPr lang="en-US" smtClean="0"/>
               <a:pPr/>
-              <a:t>10/22/2014</a:t>
+              <a:t>10/29/2014</a:t>
             </a:fld>
             <a:endParaRPr lang="en-US"/>
           </a:p>
@@ -1433,7 +1433,7 @@
     </p:spTree>
     <p:extLst>
       <p:ext uri="{BB962C8B-B14F-4D97-AF65-F5344CB8AC3E}">
-        <p14:creationId xmlns="" xmlns:p14="http://schemas.microsoft.com/office/powerpoint/2010/main" val="2660566950"/>
+        <p14:creationId xmlns:p14="http://schemas.microsoft.com/office/powerpoint/2010/main" xmlns="" val="2660566950"/>
       </p:ext>
     </p:extLst>
   </p:cSld>
@@ -1553,7 +1553,7 @@
             <a:fld id="{F1FA7AC5-6045-4418-8E60-F48788734473}" type="datetimeFigureOut">
               <a:rPr lang="en-US" smtClean="0"/>
               <a:pPr/>
-              <a:t>10/22/2014</a:t>
+              <a:t>10/29/2014</a:t>
             </a:fld>
             <a:endParaRPr lang="en-US"/>
           </a:p>
@@ -1605,7 +1605,7 @@
     </p:spTree>
     <p:extLst>
       <p:ext uri="{BB962C8B-B14F-4D97-AF65-F5344CB8AC3E}">
-        <p14:creationId xmlns="" xmlns:p14="http://schemas.microsoft.com/office/powerpoint/2010/main" val="3386326818"/>
+        <p14:creationId xmlns:p14="http://schemas.microsoft.com/office/powerpoint/2010/main" xmlns="" val="3386326818"/>
       </p:ext>
     </p:extLst>
   </p:cSld>
@@ -1801,7 +1801,7 @@
             <a:fld id="{F1FA7AC5-6045-4418-8E60-F48788734473}" type="datetimeFigureOut">
               <a:rPr lang="en-US" smtClean="0"/>
               <a:pPr/>
-              <a:t>10/22/2014</a:t>
+              <a:t>10/29/2014</a:t>
             </a:fld>
             <a:endParaRPr lang="en-US"/>
           </a:p>
@@ -1853,7 +1853,7 @@
     </p:spTree>
     <p:extLst>
       <p:ext uri="{BB962C8B-B14F-4D97-AF65-F5344CB8AC3E}">
-        <p14:creationId xmlns="" xmlns:p14="http://schemas.microsoft.com/office/powerpoint/2010/main" val="1875206763"/>
+        <p14:creationId xmlns:p14="http://schemas.microsoft.com/office/powerpoint/2010/main" xmlns="" val="1875206763"/>
       </p:ext>
     </p:extLst>
   </p:cSld>
@@ -2035,7 +2035,7 @@
             <a:fld id="{F1FA7AC5-6045-4418-8E60-F48788734473}" type="datetimeFigureOut">
               <a:rPr lang="en-US" smtClean="0"/>
               <a:pPr/>
-              <a:t>10/22/2014</a:t>
+              <a:t>10/29/2014</a:t>
             </a:fld>
             <a:endParaRPr lang="en-US"/>
           </a:p>
@@ -2087,7 +2087,7 @@
     </p:spTree>
     <p:extLst>
       <p:ext uri="{BB962C8B-B14F-4D97-AF65-F5344CB8AC3E}">
-        <p14:creationId xmlns="" xmlns:p14="http://schemas.microsoft.com/office/powerpoint/2010/main" val="3401293223"/>
+        <p14:creationId xmlns:p14="http://schemas.microsoft.com/office/powerpoint/2010/main" xmlns="" val="3401293223"/>
       </p:ext>
     </p:extLst>
   </p:cSld>
@@ -2404,7 +2404,7 @@
             <a:fld id="{F1FA7AC5-6045-4418-8E60-F48788734473}" type="datetimeFigureOut">
               <a:rPr lang="en-US" smtClean="0"/>
               <a:pPr/>
-              <a:t>10/22/2014</a:t>
+              <a:t>10/29/2014</a:t>
             </a:fld>
             <a:endParaRPr lang="en-US"/>
           </a:p>
@@ -2456,7 +2456,7 @@
     </p:spTree>
     <p:extLst>
       <p:ext uri="{BB962C8B-B14F-4D97-AF65-F5344CB8AC3E}">
-        <p14:creationId xmlns="" xmlns:p14="http://schemas.microsoft.com/office/powerpoint/2010/main" val="3056490410"/>
+        <p14:creationId xmlns:p14="http://schemas.microsoft.com/office/powerpoint/2010/main" xmlns="" val="3056490410"/>
       </p:ext>
     </p:extLst>
   </p:cSld>
@@ -2524,7 +2524,7 @@
             <a:fld id="{F1FA7AC5-6045-4418-8E60-F48788734473}" type="datetimeFigureOut">
               <a:rPr lang="en-US" smtClean="0"/>
               <a:pPr/>
-              <a:t>10/22/2014</a:t>
+              <a:t>10/29/2014</a:t>
             </a:fld>
             <a:endParaRPr lang="en-US"/>
           </a:p>
@@ -2576,7 +2576,7 @@
     </p:spTree>
     <p:extLst>
       <p:ext uri="{BB962C8B-B14F-4D97-AF65-F5344CB8AC3E}">
-        <p14:creationId xmlns="" xmlns:p14="http://schemas.microsoft.com/office/powerpoint/2010/main" val="3573976379"/>
+        <p14:creationId xmlns:p14="http://schemas.microsoft.com/office/powerpoint/2010/main" xmlns="" val="3573976379"/>
       </p:ext>
     </p:extLst>
   </p:cSld>
@@ -2621,7 +2621,7 @@
             <a:fld id="{F1FA7AC5-6045-4418-8E60-F48788734473}" type="datetimeFigureOut">
               <a:rPr lang="en-US" smtClean="0"/>
               <a:pPr/>
-              <a:t>10/22/2014</a:t>
+              <a:t>10/29/2014</a:t>
             </a:fld>
             <a:endParaRPr lang="en-US"/>
           </a:p>
@@ -2673,7 +2673,7 @@
     </p:spTree>
     <p:extLst>
       <p:ext uri="{BB962C8B-B14F-4D97-AF65-F5344CB8AC3E}">
-        <p14:creationId xmlns="" xmlns:p14="http://schemas.microsoft.com/office/powerpoint/2010/main" val="3201795056"/>
+        <p14:creationId xmlns:p14="http://schemas.microsoft.com/office/powerpoint/2010/main" xmlns="" val="3201795056"/>
       </p:ext>
     </p:extLst>
   </p:cSld>
@@ -2900,7 +2900,7 @@
             <a:fld id="{F1FA7AC5-6045-4418-8E60-F48788734473}" type="datetimeFigureOut">
               <a:rPr lang="en-US" smtClean="0"/>
               <a:pPr/>
-              <a:t>10/22/2014</a:t>
+              <a:t>10/29/2014</a:t>
             </a:fld>
             <a:endParaRPr lang="en-US"/>
           </a:p>
@@ -2952,7 +2952,7 @@
     </p:spTree>
     <p:extLst>
       <p:ext uri="{BB962C8B-B14F-4D97-AF65-F5344CB8AC3E}">
-        <p14:creationId xmlns="" xmlns:p14="http://schemas.microsoft.com/office/powerpoint/2010/main" val="2526201297"/>
+        <p14:creationId xmlns:p14="http://schemas.microsoft.com/office/powerpoint/2010/main" xmlns="" val="2526201297"/>
       </p:ext>
     </p:extLst>
   </p:cSld>
@@ -3155,7 +3155,7 @@
             <a:fld id="{F1FA7AC5-6045-4418-8E60-F48788734473}" type="datetimeFigureOut">
               <a:rPr lang="en-US" smtClean="0"/>
               <a:pPr/>
-              <a:t>10/22/2014</a:t>
+              <a:t>10/29/2014</a:t>
             </a:fld>
             <a:endParaRPr lang="en-US"/>
           </a:p>
@@ -3207,7 +3207,7 @@
     </p:spTree>
     <p:extLst>
       <p:ext uri="{BB962C8B-B14F-4D97-AF65-F5344CB8AC3E}">
-        <p14:creationId xmlns="" xmlns:p14="http://schemas.microsoft.com/office/powerpoint/2010/main" val="242868210"/>
+        <p14:creationId xmlns:p14="http://schemas.microsoft.com/office/powerpoint/2010/main" xmlns="" val="242868210"/>
       </p:ext>
     </p:extLst>
   </p:cSld>
@@ -3370,7 +3370,7 @@
             <a:fld id="{F1FA7AC5-6045-4418-8E60-F48788734473}" type="datetimeFigureOut">
               <a:rPr lang="en-US" smtClean="0"/>
               <a:pPr/>
-              <a:t>10/22/2014</a:t>
+              <a:t>10/29/2014</a:t>
             </a:fld>
             <a:endParaRPr lang="en-US"/>
           </a:p>
@@ -3458,7 +3458,7 @@
     </p:spTree>
     <p:extLst>
       <p:ext uri="{BB962C8B-B14F-4D97-AF65-F5344CB8AC3E}">
-        <p14:creationId xmlns="" xmlns:p14="http://schemas.microsoft.com/office/powerpoint/2010/main" val="3931132979"/>
+        <p14:creationId xmlns:p14="http://schemas.microsoft.com/office/powerpoint/2010/main" xmlns="" val="3931132979"/>
       </p:ext>
     </p:extLst>
   </p:cSld>
@@ -5389,7 +5389,7 @@
     </p:spTree>
     <p:extLst>
       <p:ext uri="{BB962C8B-B14F-4D97-AF65-F5344CB8AC3E}">
-        <p14:creationId xmlns="" xmlns:p14="http://schemas.microsoft.com/office/powerpoint/2010/main" val="461431175"/>
+        <p14:creationId xmlns:p14="http://schemas.microsoft.com/office/powerpoint/2010/main" xmlns="" val="461431175"/>
       </p:ext>
     </p:extLst>
   </p:cSld>
@@ -8362,7 +8362,7 @@
     </p:spTree>
     <p:extLst>
       <p:ext uri="{BB962C8B-B14F-4D97-AF65-F5344CB8AC3E}">
-        <p14:creationId xmlns="" xmlns:p14="http://schemas.microsoft.com/office/powerpoint/2010/main" val="4157082590"/>
+        <p14:creationId xmlns:p14="http://schemas.microsoft.com/office/powerpoint/2010/main" xmlns="" val="4157082590"/>
       </p:ext>
     </p:extLst>
   </p:cSld>
@@ -10388,7 +10388,7 @@
         </p:nvSpPr>
         <p:spPr>
           <a:xfrm>
-            <a:off x="3020070" y="540875"/>
+            <a:off x="3020070" y="516383"/>
             <a:ext cx="3937000" cy="539540"/>
           </a:xfrm>
           <a:prstGeom prst="rightArrow">
@@ -10432,7 +10432,7 @@
         </p:nvSpPr>
         <p:spPr>
           <a:xfrm>
-            <a:off x="3020070" y="862007"/>
+            <a:off x="3020070" y="837515"/>
             <a:ext cx="3937000" cy="539540"/>
           </a:xfrm>
           <a:prstGeom prst="rightArrow">
@@ -10476,7 +10476,7 @@
         </p:nvSpPr>
         <p:spPr>
           <a:xfrm>
-            <a:off x="3020070" y="1496093"/>
+            <a:off x="3020070" y="1479765"/>
             <a:ext cx="3937000" cy="539540"/>
           </a:xfrm>
           <a:prstGeom prst="rightArrow">
@@ -10513,57 +10513,13 @@
       </p:sp>
       <p:sp>
         <p:nvSpPr>
-          <p:cNvPr id="92" name="Right Arrow 13"/>
-          <p:cNvSpPr/>
-          <p:nvPr/>
-        </p:nvSpPr>
-        <p:spPr>
-          <a:xfrm>
-            <a:off x="3020070" y="1811783"/>
-            <a:ext cx="3937000" cy="539540"/>
-          </a:xfrm>
-          <a:prstGeom prst="rightArrow">
-            <a:avLst/>
-          </a:prstGeom>
-        </p:spPr>
-        <p:style>
-          <a:lnRef idx="2">
-            <a:schemeClr val="accent1">
-              <a:shade val="50000"/>
-            </a:schemeClr>
-          </a:lnRef>
-          <a:fillRef idx="1">
-            <a:schemeClr val="accent1"/>
-          </a:fillRef>
-          <a:effectRef idx="0">
-            <a:schemeClr val="accent1"/>
-          </a:effectRef>
-          <a:fontRef idx="minor">
-            <a:schemeClr val="lt1"/>
-          </a:fontRef>
-        </p:style>
-        <p:txBody>
-          <a:bodyPr rtlCol="0" anchor="ctr"/>
-          <a:lstStyle/>
-          <a:p>
-            <a:pPr algn="ctr"/>
-            <a:r>
-              <a:rPr lang="en-US" sz="2000" dirty="0" smtClean="0"/>
-              <a:t>ESPECIFICAÇÃO DE PRODUTO</a:t>
-            </a:r>
-            <a:endParaRPr lang="en-US" sz="2000" dirty="0"/>
-          </a:p>
-        </p:txBody>
-      </p:sp>
-      <p:sp>
-        <p:nvSpPr>
           <p:cNvPr id="93" name="Right Arrow 13"/>
           <p:cNvSpPr/>
           <p:nvPr/>
         </p:nvSpPr>
         <p:spPr>
           <a:xfrm>
-            <a:off x="3020070" y="2568336"/>
+            <a:off x="3020070" y="2609156"/>
             <a:ext cx="3937000" cy="539540"/>
           </a:xfrm>
           <a:prstGeom prst="rightArrow">
@@ -10637,11 +10593,11 @@
             <a:pPr algn="ctr"/>
             <a:r>
               <a:rPr lang="en-US" sz="2000" dirty="0" smtClean="0"/>
-              <a:t>ESPECIFICAÇÃO </a:t>
+              <a:t>CAMPO DE </a:t>
             </a:r>
             <a:r>
               <a:rPr lang="en-US" sz="2000" dirty="0" smtClean="0"/>
-              <a:t>DE SKU</a:t>
+              <a:t>SKU</a:t>
             </a:r>
             <a:endParaRPr lang="en-US" sz="2000" dirty="0"/>
           </a:p>
@@ -10649,57 +10605,13 @@
       </p:sp>
       <p:sp>
         <p:nvSpPr>
-          <p:cNvPr id="95" name="Right Arrow 13"/>
-          <p:cNvSpPr/>
-          <p:nvPr/>
-        </p:nvSpPr>
-        <p:spPr>
-          <a:xfrm>
-            <a:off x="3020070" y="3248706"/>
-            <a:ext cx="3937000" cy="539540"/>
-          </a:xfrm>
-          <a:prstGeom prst="rightArrow">
-            <a:avLst/>
-          </a:prstGeom>
-        </p:spPr>
-        <p:style>
-          <a:lnRef idx="2">
-            <a:schemeClr val="accent1">
-              <a:shade val="50000"/>
-            </a:schemeClr>
-          </a:lnRef>
-          <a:fillRef idx="1">
-            <a:schemeClr val="accent1"/>
-          </a:fillRef>
-          <a:effectRef idx="0">
-            <a:schemeClr val="accent1"/>
-          </a:effectRef>
-          <a:fontRef idx="minor">
-            <a:schemeClr val="lt1"/>
-          </a:fontRef>
-        </p:style>
-        <p:txBody>
-          <a:bodyPr rtlCol="0" anchor="ctr"/>
-          <a:lstStyle/>
-          <a:p>
-            <a:pPr algn="ctr"/>
-            <a:r>
-              <a:rPr lang="en-US" sz="2000" dirty="0" smtClean="0"/>
-              <a:t>IMAGEM DE SKU</a:t>
-            </a:r>
-            <a:endParaRPr lang="en-US" sz="2000" dirty="0"/>
-          </a:p>
-        </p:txBody>
-      </p:sp>
-      <p:sp>
-        <p:nvSpPr>
           <p:cNvPr id="96" name="Right Arrow 13"/>
           <p:cNvSpPr/>
           <p:nvPr/>
         </p:nvSpPr>
         <p:spPr>
           <a:xfrm>
-            <a:off x="3020070" y="4037911"/>
+            <a:off x="3020070" y="4217519"/>
             <a:ext cx="3937000" cy="539540"/>
           </a:xfrm>
           <a:prstGeom prst="rightArrow">
@@ -10743,7 +10655,7 @@
         </p:nvSpPr>
         <p:spPr>
           <a:xfrm>
-            <a:off x="3020070" y="4394425"/>
+            <a:off x="3020070" y="4663837"/>
             <a:ext cx="3937000" cy="539540"/>
           </a:xfrm>
           <a:prstGeom prst="rightArrow">
@@ -10781,57 +10693,13 @@
       </p:sp>
       <p:sp>
         <p:nvSpPr>
-          <p:cNvPr id="100" name="Right Arrow 13"/>
-          <p:cNvSpPr/>
-          <p:nvPr/>
-        </p:nvSpPr>
-        <p:spPr>
-          <a:xfrm>
-            <a:off x="3020070" y="5575376"/>
-            <a:ext cx="3937000" cy="768257"/>
-          </a:xfrm>
-          <a:prstGeom prst="rightArrow">
-            <a:avLst/>
-          </a:prstGeom>
-        </p:spPr>
-        <p:style>
-          <a:lnRef idx="2">
-            <a:schemeClr val="accent1">
-              <a:shade val="50000"/>
-            </a:schemeClr>
-          </a:lnRef>
-          <a:fillRef idx="1">
-            <a:schemeClr val="accent1"/>
-          </a:fillRef>
-          <a:effectRef idx="0">
-            <a:schemeClr val="accent1"/>
-          </a:effectRef>
-          <a:fontRef idx="minor">
-            <a:schemeClr val="lt1"/>
-          </a:fontRef>
-        </p:style>
-        <p:txBody>
-          <a:bodyPr rtlCol="0" anchor="ctr"/>
-          <a:lstStyle/>
-          <a:p>
-            <a:pPr algn="ctr"/>
-            <a:r>
-              <a:rPr lang="en-US" sz="2000" dirty="0" smtClean="0"/>
-              <a:t>ATIVA PRODUTO</a:t>
-            </a:r>
-            <a:endParaRPr lang="en-US" sz="2000" dirty="0"/>
-          </a:p>
-        </p:txBody>
-      </p:sp>
-      <p:sp>
-        <p:nvSpPr>
           <p:cNvPr id="102" name="Right Arrow 13"/>
           <p:cNvSpPr/>
           <p:nvPr/>
         </p:nvSpPr>
         <p:spPr>
           <a:xfrm>
-            <a:off x="3020070" y="4947578"/>
+            <a:off x="3020070" y="5519058"/>
             <a:ext cx="3937000" cy="800109"/>
           </a:xfrm>
           <a:prstGeom prst="rightArrow">
@@ -12842,10 +12710,186 @@
           </a:fontRef>
         </p:style>
       </p:cxnSp>
+      <p:sp>
+        <p:nvSpPr>
+          <p:cNvPr id="119" name="Right Arrow 13"/>
+          <p:cNvSpPr/>
+          <p:nvPr/>
+        </p:nvSpPr>
+        <p:spPr>
+          <a:xfrm>
+            <a:off x="3025518" y="1754625"/>
+            <a:ext cx="3937000" cy="539540"/>
+          </a:xfrm>
+          <a:prstGeom prst="rightArrow">
+            <a:avLst/>
+          </a:prstGeom>
+        </p:spPr>
+        <p:style>
+          <a:lnRef idx="2">
+            <a:schemeClr val="accent1">
+              <a:shade val="50000"/>
+            </a:schemeClr>
+          </a:lnRef>
+          <a:fillRef idx="1">
+            <a:schemeClr val="accent1"/>
+          </a:fillRef>
+          <a:effectRef idx="0">
+            <a:schemeClr val="accent1"/>
+          </a:effectRef>
+          <a:fontRef idx="minor">
+            <a:schemeClr val="lt1"/>
+          </a:fontRef>
+        </p:style>
+        <p:txBody>
+          <a:bodyPr rtlCol="0" anchor="ctr"/>
+          <a:lstStyle/>
+          <a:p>
+            <a:pPr algn="ctr"/>
+            <a:r>
+              <a:rPr lang="en-US" sz="2000" dirty="0" smtClean="0"/>
+              <a:t>CAMPO DE PRODUTO</a:t>
+            </a:r>
+            <a:endParaRPr lang="en-US" sz="2000" dirty="0"/>
+          </a:p>
+        </p:txBody>
+      </p:sp>
+      <p:sp>
+        <p:nvSpPr>
+          <p:cNvPr id="120" name="Right Arrow 13"/>
+          <p:cNvSpPr/>
+          <p:nvPr/>
+        </p:nvSpPr>
+        <p:spPr>
+          <a:xfrm>
+            <a:off x="3033682" y="3207873"/>
+            <a:ext cx="3937000" cy="539540"/>
+          </a:xfrm>
+          <a:prstGeom prst="rightArrow">
+            <a:avLst/>
+          </a:prstGeom>
+        </p:spPr>
+        <p:style>
+          <a:lnRef idx="2">
+            <a:schemeClr val="accent1">
+              <a:shade val="50000"/>
+            </a:schemeClr>
+          </a:lnRef>
+          <a:fillRef idx="1">
+            <a:schemeClr val="accent1"/>
+          </a:fillRef>
+          <a:effectRef idx="0">
+            <a:schemeClr val="accent1"/>
+          </a:effectRef>
+          <a:fontRef idx="minor">
+            <a:schemeClr val="lt1"/>
+          </a:fontRef>
+        </p:style>
+        <p:txBody>
+          <a:bodyPr rtlCol="0" anchor="ctr"/>
+          <a:lstStyle/>
+          <a:p>
+            <a:pPr algn="ctr"/>
+            <a:r>
+              <a:rPr lang="en-US" sz="2000" dirty="0" smtClean="0"/>
+              <a:t>ESPECIFICAÇÃO DE SKU</a:t>
+            </a:r>
+            <a:endParaRPr lang="en-US" sz="2000" dirty="0"/>
+          </a:p>
+        </p:txBody>
+      </p:sp>
+      <p:sp>
+        <p:nvSpPr>
+          <p:cNvPr id="95" name="Right Arrow 13"/>
+          <p:cNvSpPr/>
+          <p:nvPr/>
+        </p:nvSpPr>
+        <p:spPr>
+          <a:xfrm>
+            <a:off x="3020070" y="3518118"/>
+            <a:ext cx="3937000" cy="539540"/>
+          </a:xfrm>
+          <a:prstGeom prst="rightArrow">
+            <a:avLst/>
+          </a:prstGeom>
+        </p:spPr>
+        <p:style>
+          <a:lnRef idx="2">
+            <a:schemeClr val="accent1">
+              <a:shade val="50000"/>
+            </a:schemeClr>
+          </a:lnRef>
+          <a:fillRef idx="1">
+            <a:schemeClr val="accent1"/>
+          </a:fillRef>
+          <a:effectRef idx="0">
+            <a:schemeClr val="accent1"/>
+          </a:effectRef>
+          <a:fontRef idx="minor">
+            <a:schemeClr val="lt1"/>
+          </a:fontRef>
+        </p:style>
+        <p:txBody>
+          <a:bodyPr rtlCol="0" anchor="ctr"/>
+          <a:lstStyle/>
+          <a:p>
+            <a:pPr algn="ctr"/>
+            <a:r>
+              <a:rPr lang="en-US" sz="2000" dirty="0" smtClean="0"/>
+              <a:t>IMAGEM DE SKU</a:t>
+            </a:r>
+            <a:endParaRPr lang="en-US" sz="2000" dirty="0"/>
+          </a:p>
+        </p:txBody>
+      </p:sp>
+      <p:sp>
+        <p:nvSpPr>
+          <p:cNvPr id="92" name="Right Arrow 13"/>
+          <p:cNvSpPr/>
+          <p:nvPr/>
+        </p:nvSpPr>
+        <p:spPr>
+          <a:xfrm>
+            <a:off x="3020070" y="2048539"/>
+            <a:ext cx="3937000" cy="539540"/>
+          </a:xfrm>
+          <a:prstGeom prst="rightArrow">
+            <a:avLst/>
+          </a:prstGeom>
+        </p:spPr>
+        <p:style>
+          <a:lnRef idx="2">
+            <a:schemeClr val="accent1">
+              <a:shade val="50000"/>
+            </a:schemeClr>
+          </a:lnRef>
+          <a:fillRef idx="1">
+            <a:schemeClr val="accent1"/>
+          </a:fillRef>
+          <a:effectRef idx="0">
+            <a:schemeClr val="accent1"/>
+          </a:effectRef>
+          <a:fontRef idx="minor">
+            <a:schemeClr val="lt1"/>
+          </a:fontRef>
+        </p:style>
+        <p:txBody>
+          <a:bodyPr rtlCol="0" anchor="ctr"/>
+          <a:lstStyle/>
+          <a:p>
+            <a:pPr algn="ctr"/>
+            <a:r>
+              <a:rPr lang="en-US" sz="2000" dirty="0" smtClean="0"/>
+              <a:t>ESPECIFICAÇÃO DE PRODUTO</a:t>
+            </a:r>
+            <a:endParaRPr lang="en-US" sz="2000" dirty="0"/>
+          </a:p>
+        </p:txBody>
+      </p:sp>
     </p:spTree>
     <p:extLst>
       <p:ext uri="{BB962C8B-B14F-4D97-AF65-F5344CB8AC3E}">
-        <p14:creationId xmlns="" xmlns:p14="http://schemas.microsoft.com/office/powerpoint/2010/main" val="4157082590"/>
+        <p14:creationId xmlns:p14="http://schemas.microsoft.com/office/powerpoint/2010/main" xmlns="" val="4157082590"/>
       </p:ext>
     </p:extLst>
   </p:cSld>
@@ -14309,7 +14353,7 @@
     </p:spTree>
     <p:extLst>
       <p:ext uri="{BB962C8B-B14F-4D97-AF65-F5344CB8AC3E}">
-        <p14:creationId xmlns="" xmlns:p14="http://schemas.microsoft.com/office/powerpoint/2010/main" val="2653181294"/>
+        <p14:creationId xmlns:p14="http://schemas.microsoft.com/office/powerpoint/2010/main" xmlns="" val="2653181294"/>
       </p:ext>
     </p:extLst>
   </p:cSld>
@@ -15279,7 +15323,7 @@
     </p:spTree>
     <p:extLst>
       <p:ext uri="{BB962C8B-B14F-4D97-AF65-F5344CB8AC3E}">
-        <p14:creationId xmlns="" xmlns:p14="http://schemas.microsoft.com/office/powerpoint/2010/main" val="295285881"/>
+        <p14:creationId xmlns:p14="http://schemas.microsoft.com/office/powerpoint/2010/main" xmlns="" val="295285881"/>
       </p:ext>
     </p:extLst>
   </p:cSld>
@@ -15551,7 +15595,7 @@
   <a:extraClrSchemeLst/>
   <a:extLst>
     <a:ext uri="{05A4C25C-085E-4340-85A3-A5531E510DB2}">
-      <thm15:themeFamily xmlns="" xmlns:thm15="http://schemas.microsoft.com/office/thememl/2012/main" name="Office Theme" id="{62F939B6-93AF-4DB8-9C6B-D6C7DFDC589F}" vid="{4A3C46E8-61CC-4603-A589-7422A47A8E4A}"/>
+      <thm15:themeFamily xmlns:thm15="http://schemas.microsoft.com/office/thememl/2012/main" xmlns="" name="Office Theme" id="{62F939B6-93AF-4DB8-9C6B-D6C7DFDC589F}" vid="{4A3C46E8-61CC-4603-A589-7422A47A8E4A}"/>
     </a:ext>
   </a:extLst>
 </a:theme>
@@ -15812,7 +15856,7 @@
   <a:extraClrSchemeLst/>
   <a:extLst>
     <a:ext uri="{05A4C25C-085E-4340-85A3-A5531E510DB2}">
-      <thm15:themeFamily xmlns="" xmlns:thm15="http://schemas.microsoft.com/office/thememl/2012/main" name="Office Theme" id="{62F939B6-93AF-4DB8-9C6B-D6C7DFDC589F}" vid="{4A3C46E8-61CC-4603-A589-7422A47A8E4A}"/>
+      <thm15:themeFamily xmlns:thm15="http://schemas.microsoft.com/office/thememl/2012/main" xmlns="" name="Office Theme" id="{62F939B6-93AF-4DB8-9C6B-D6C7DFDC589F}" vid="{4A3C46E8-61CC-4603-A589-7422A47A8E4A}"/>
     </a:ext>
   </a:extLst>
 </a:theme>

</xml_diff>